<commit_message>
Updated for virtual session
</commit_message>
<xml_diff>
--- a/Introduction to Machine Learning Classification Only.pptx
+++ b/Introduction to Machine Learning Classification Only.pptx
@@ -5,25 +5,27 @@
     <p:sldMasterId id="2147483659" r:id="rId1"/>
   </p:sldMasterIdLst>
   <p:notesMasterIdLst>
-    <p:notesMasterId r:id="rId8"/>
+    <p:notesMasterId r:id="rId10"/>
   </p:notesMasterIdLst>
   <p:sldIdLst>
     <p:sldId id="256" r:id="rId2"/>
     <p:sldId id="259" r:id="rId3"/>
     <p:sldId id="261" r:id="rId4"/>
-    <p:sldId id="265" r:id="rId5"/>
-    <p:sldId id="266" r:id="rId6"/>
-    <p:sldId id="267" r:id="rId7"/>
+    <p:sldId id="269" r:id="rId5"/>
+    <p:sldId id="268" r:id="rId6"/>
+    <p:sldId id="265" r:id="rId7"/>
+    <p:sldId id="266" r:id="rId8"/>
+    <p:sldId id="267" r:id="rId9"/>
   </p:sldIdLst>
   <p:sldSz cx="9144000" cy="5143500" type="screen16x9"/>
   <p:notesSz cx="6858000" cy="9144000"/>
   <p:embeddedFontLst>
     <p:embeddedFont>
       <p:font typeface="Proxima Nova" panose="020B0604020202020204" charset="0"/>
-      <p:regular r:id="rId9"/>
-      <p:bold r:id="rId10"/>
-      <p:italic r:id="rId11"/>
-      <p:boldItalic r:id="rId12"/>
+      <p:regular r:id="rId11"/>
+      <p:bold r:id="rId12"/>
+      <p:italic r:id="rId13"/>
+      <p:boldItalic r:id="rId14"/>
     </p:embeddedFont>
   </p:embeddedFontLst>
   <p:defaultTextStyle>
@@ -6766,7 +6768,7 @@
               <a:buNone/>
             </a:pPr>
             <a:r>
-              <a:rPr lang="en" sz="3600" dirty="0" smtClean="0"/>
+              <a:rPr lang="en" sz="3600" dirty="0"/>
               <a:t>Python 3</a:t>
             </a:r>
             <a:endParaRPr sz="3600" dirty="0"/>
@@ -6808,12 +6810,8 @@
               <a:buNone/>
             </a:pPr>
             <a:r>
-              <a:rPr lang="en" dirty="0" smtClean="0"/>
-              <a:t>Business </a:t>
-            </a:r>
-            <a:r>
               <a:rPr lang="en" dirty="0"/>
-              <a:t>Career Hub </a:t>
+              <a:t>Business Career Hub </a:t>
             </a:r>
             <a:endParaRPr dirty="0"/>
           </a:p>
@@ -6922,10 +6920,10 @@
               <a:buChar char="●"/>
             </a:pPr>
             <a:r>
-              <a:rPr lang="en" dirty="0" smtClean="0"/>
+              <a:rPr lang="en" dirty="0"/>
               <a:t>Why Machine Learning?</a:t>
             </a:r>
-            <a:endParaRPr dirty="0" smtClean="0"/>
+            <a:endParaRPr dirty="0"/>
           </a:p>
           <a:p>
             <a:pPr marL="914400" lvl="1" indent="-317500" algn="l" rtl="0">
@@ -6939,10 +6937,10 @@
               <a:buChar char="○"/>
             </a:pPr>
             <a:r>
-              <a:rPr lang="en" dirty="0" smtClean="0"/>
+              <a:rPr lang="en" dirty="0"/>
               <a:t>Utilize Big Data</a:t>
             </a:r>
-            <a:endParaRPr dirty="0" smtClean="0"/>
+            <a:endParaRPr dirty="0"/>
           </a:p>
           <a:p>
             <a:pPr marL="914400" lvl="1" indent="-317500" algn="l" rtl="0">
@@ -6956,10 +6954,10 @@
               <a:buChar char="○"/>
             </a:pPr>
             <a:r>
-              <a:rPr lang="en" dirty="0" smtClean="0"/>
+              <a:rPr lang="en" dirty="0"/>
               <a:t>Hardware Improvements</a:t>
             </a:r>
-            <a:endParaRPr dirty="0" smtClean="0"/>
+            <a:endParaRPr dirty="0"/>
           </a:p>
           <a:p>
             <a:pPr marL="457200" lvl="0" indent="-342900" algn="l" rtl="0">
@@ -6973,12 +6971,8 @@
               <a:buChar char="●"/>
             </a:pPr>
             <a:r>
-              <a:rPr lang="en" dirty="0" smtClean="0"/>
-              <a:t>Popular/Common </a:t>
-            </a:r>
-            <a:r>
               <a:rPr lang="en" dirty="0"/>
-              <a:t>examples</a:t>
+              <a:t>Popular/Common examples</a:t>
             </a:r>
             <a:endParaRPr dirty="0"/>
           </a:p>
@@ -7192,14 +7186,10 @@
               <a:buChar char="●"/>
             </a:pPr>
             <a:r>
-              <a:rPr lang="en" dirty="0" smtClean="0"/>
-              <a:t>Training/Validation/Test </a:t>
+              <a:rPr lang="en" sz="2400" dirty="0"/>
+              <a:t>Training/Validation/Test Sets</a:t>
             </a:r>
-            <a:r>
-              <a:rPr lang="en" dirty="0"/>
-              <a:t>Sets</a:t>
-            </a:r>
-            <a:endParaRPr dirty="0"/>
+            <a:endParaRPr sz="2400" dirty="0"/>
           </a:p>
           <a:p>
             <a:pPr marL="914400" marR="0" lvl="1" indent="-317500" algn="l" rtl="0">
@@ -7216,10 +7206,10 @@
               <a:buChar char="○"/>
             </a:pPr>
             <a:r>
-              <a:rPr lang="en" dirty="0"/>
+              <a:rPr lang="en" sz="2000" dirty="0"/>
               <a:t>Training Set</a:t>
             </a:r>
-            <a:endParaRPr dirty="0"/>
+            <a:endParaRPr sz="2000" dirty="0"/>
           </a:p>
           <a:p>
             <a:pPr marL="1371600" marR="0" lvl="2" indent="-317500" algn="l" rtl="0">
@@ -7236,10 +7226,13 @@
               <a:buChar char="■"/>
             </a:pPr>
             <a:r>
-              <a:rPr lang="en" dirty="0"/>
-              <a:t>Fed to our model to learn the relationships between the features in the data</a:t>
+              <a:rPr lang="en" sz="2000" dirty="0"/>
+              <a:t>Fed to our model to learn the relationship between the features </a:t>
             </a:r>
-            <a:endParaRPr dirty="0"/>
+            <a:r>
+              <a:rPr lang="en-US" sz="2000" dirty="0"/>
+              <a:t>and the target label</a:t>
+            </a:r>
           </a:p>
           <a:p>
             <a:pPr marL="914400" marR="0" lvl="1" indent="-317500" algn="l" rtl="0">
@@ -7256,10 +7249,9 @@
               <a:buChar char="○"/>
             </a:pPr>
             <a:r>
-              <a:rPr lang="en" dirty="0"/>
-              <a:t>Validation Set</a:t>
+              <a:rPr lang="en-US" sz="2000" dirty="0"/>
+              <a:t>Test Set</a:t>
             </a:r>
-            <a:endParaRPr dirty="0"/>
           </a:p>
           <a:p>
             <a:pPr marL="1371600" marR="0" lvl="2" indent="-317500" algn="l" rtl="0">
@@ -7276,125 +7268,14 @@
               <a:buChar char="■"/>
             </a:pPr>
             <a:r>
-              <a:rPr lang="en" dirty="0"/>
-              <a:t>Used for model selection. Trained models generate predictions that are tested against the validation set to gauge their effectiveness. </a:t>
-            </a:r>
-            <a:endParaRPr dirty="0"/>
-          </a:p>
-          <a:p>
-            <a:pPr marL="914400" marR="0" lvl="1" indent="-317500" algn="l" rtl="0">
-              <a:lnSpc>
-                <a:spcPct val="115000"/>
-              </a:lnSpc>
-              <a:spcBef>
-                <a:spcPts val="0"/>
-              </a:spcBef>
-              <a:spcAft>
-                <a:spcPts val="0"/>
-              </a:spcAft>
-              <a:buSzPts val="1400"/>
-              <a:buChar char="○"/>
-            </a:pPr>
-            <a:r>
-              <a:rPr lang="en" dirty="0"/>
-              <a:t>Test Set</a:t>
-            </a:r>
-            <a:endParaRPr dirty="0"/>
-          </a:p>
-          <a:p>
-            <a:pPr marL="1371600" marR="0" lvl="2" indent="-317500" algn="l" rtl="0">
-              <a:lnSpc>
-                <a:spcPct val="115000"/>
-              </a:lnSpc>
-              <a:spcBef>
-                <a:spcPts val="0"/>
-              </a:spcBef>
-              <a:spcAft>
-                <a:spcPts val="0"/>
-              </a:spcAft>
-              <a:buSzPts val="1400"/>
-              <a:buChar char="■"/>
-            </a:pPr>
-            <a:r>
-              <a:rPr lang="en" dirty="0"/>
-              <a:t>Once the best model is found, it is tested again to ensure it is robust and not overfit</a:t>
+              <a:rPr lang="en-US" sz="2000" dirty="0"/>
+              <a:t>Test our model on data </a:t>
             </a:r>
             <a:r>
-              <a:rPr lang="en" dirty="0" smtClean="0"/>
-              <a:t>.</a:t>
+              <a:rPr lang="en" sz="2000" dirty="0"/>
+              <a:t> is robust and not overfit. </a:t>
             </a:r>
-            <a:endParaRPr lang="en" dirty="0"/>
-          </a:p>
-          <a:p>
-            <a:pPr lvl="0"/>
-            <a:r>
-              <a:rPr lang="en-US" dirty="0"/>
-              <a:t>Tuples</a:t>
-            </a:r>
-          </a:p>
-          <a:p>
-            <a:pPr lvl="1">
-              <a:spcBef>
-                <a:spcPts val="0"/>
-              </a:spcBef>
-            </a:pPr>
-            <a:r>
-              <a:rPr lang="en-US" dirty="0"/>
-              <a:t>Sequence of Immutable Python objects</a:t>
-            </a:r>
-          </a:p>
-          <a:p>
-            <a:pPr lvl="2">
-              <a:spcBef>
-                <a:spcPts val="0"/>
-              </a:spcBef>
-            </a:pPr>
-            <a:r>
-              <a:rPr lang="en-US" dirty="0"/>
-              <a:t>Values cannot be updated</a:t>
-            </a:r>
-          </a:p>
-          <a:p>
-            <a:pPr lvl="1">
-              <a:spcBef>
-                <a:spcPts val="0"/>
-              </a:spcBef>
-            </a:pPr>
-            <a:r>
-              <a:rPr lang="en-US" dirty="0"/>
-              <a:t>Defined using parentheses</a:t>
-            </a:r>
-          </a:p>
-          <a:p>
-            <a:pPr lvl="1">
-              <a:spcBef>
-                <a:spcPts val="0"/>
-              </a:spcBef>
-            </a:pPr>
-            <a:r>
-              <a:rPr lang="en-US" dirty="0"/>
-              <a:t>Accessing values using square brackets similar to lists</a:t>
-            </a:r>
-          </a:p>
-          <a:p>
-            <a:pPr marL="1054100" marR="0" lvl="2" indent="0" algn="l" rtl="0">
-              <a:lnSpc>
-                <a:spcPct val="115000"/>
-              </a:lnSpc>
-              <a:spcBef>
-                <a:spcPts val="0"/>
-              </a:spcBef>
-              <a:spcAft>
-                <a:spcPts val="0"/>
-              </a:spcAft>
-              <a:buSzPts val="1400"/>
-              <a:buNone/>
-            </a:pPr>
-            <a:r>
-              <a:rPr lang="en" dirty="0" smtClean="0"/>
-              <a:t> </a:t>
-            </a:r>
-            <a:endParaRPr dirty="0"/>
+            <a:endParaRPr sz="2000" dirty="0"/>
           </a:p>
         </p:txBody>
       </p:sp>
@@ -7407,6 +7288,159 @@
 </file>
 
 <file path=ppt/slides/slide4.xml><?xml version="1.0" encoding="utf-8"?>
+<p:sld xmlns:a="http://schemas.openxmlformats.org/drawingml/2006/main" xmlns:r="http://schemas.openxmlformats.org/officeDocument/2006/relationships" xmlns:p="http://schemas.openxmlformats.org/presentationml/2006/main">
+  <p:cSld>
+    <p:spTree>
+      <p:nvGrpSpPr>
+        <p:cNvPr id="1" name=""/>
+        <p:cNvGrpSpPr/>
+        <p:nvPr/>
+      </p:nvGrpSpPr>
+      <p:grpSpPr>
+        <a:xfrm>
+          <a:off x="0" y="0"/>
+          <a:ext cx="0" cy="0"/>
+          <a:chOff x="0" y="0"/>
+          <a:chExt cx="0" cy="0"/>
+        </a:xfrm>
+      </p:grpSpPr>
+      <p:pic>
+        <p:nvPicPr>
+          <p:cNvPr id="3" name="Picture 2" descr="A screenshot of a cell phone&#10;&#10;Description automatically generated">
+            <a:extLst>
+              <a:ext uri="{FF2B5EF4-FFF2-40B4-BE49-F238E27FC236}">
+                <a16:creationId xmlns:a16="http://schemas.microsoft.com/office/drawing/2014/main" id="{0549FC72-6CAE-4ECE-86B6-8CAB678342AE}"/>
+              </a:ext>
+            </a:extLst>
+          </p:cNvPr>
+          <p:cNvPicPr>
+            <a:picLocks noChangeAspect="1"/>
+          </p:cNvPicPr>
+          <p:nvPr/>
+        </p:nvPicPr>
+        <p:blipFill>
+          <a:blip r:embed="rId2"/>
+          <a:stretch>
+            <a:fillRect/>
+          </a:stretch>
+        </p:blipFill>
+        <p:spPr>
+          <a:xfrm>
+            <a:off x="922632" y="435027"/>
+            <a:ext cx="7298735" cy="4089194"/>
+          </a:xfrm>
+          <a:prstGeom prst="rect">
+            <a:avLst/>
+          </a:prstGeom>
+        </p:spPr>
+      </p:pic>
+    </p:spTree>
+    <p:extLst>
+      <p:ext uri="{BB962C8B-B14F-4D97-AF65-F5344CB8AC3E}">
+        <p14:creationId xmlns:p14="http://schemas.microsoft.com/office/powerpoint/2010/main" val="1368029114"/>
+      </p:ext>
+    </p:extLst>
+  </p:cSld>
+  <p:clrMapOvr>
+    <a:masterClrMapping/>
+  </p:clrMapOvr>
+</p:sld>
+</file>
+
+<file path=ppt/slides/slide5.xml><?xml version="1.0" encoding="utf-8"?>
+<p:sld xmlns:a="http://schemas.openxmlformats.org/drawingml/2006/main" xmlns:r="http://schemas.openxmlformats.org/officeDocument/2006/relationships" xmlns:p="http://schemas.openxmlformats.org/presentationml/2006/main">
+  <p:cSld>
+    <p:spTree>
+      <p:nvGrpSpPr>
+        <p:cNvPr id="1" name=""/>
+        <p:cNvGrpSpPr/>
+        <p:nvPr/>
+      </p:nvGrpSpPr>
+      <p:grpSpPr>
+        <a:xfrm>
+          <a:off x="0" y="0"/>
+          <a:ext cx="0" cy="0"/>
+          <a:chOff x="0" y="0"/>
+          <a:chExt cx="0" cy="0"/>
+        </a:xfrm>
+      </p:grpSpPr>
+      <p:sp>
+        <p:nvSpPr>
+          <p:cNvPr id="2" name="Title 1">
+            <a:extLst>
+              <a:ext uri="{FF2B5EF4-FFF2-40B4-BE49-F238E27FC236}">
+                <a16:creationId xmlns:a16="http://schemas.microsoft.com/office/drawing/2014/main" id="{9E165058-6687-4582-AD8F-B371667B5AF1}"/>
+              </a:ext>
+            </a:extLst>
+          </p:cNvPr>
+          <p:cNvSpPr>
+            <a:spLocks noGrp="1"/>
+          </p:cNvSpPr>
+          <p:nvPr>
+            <p:ph type="title"/>
+          </p:nvPr>
+        </p:nvSpPr>
+        <p:spPr>
+          <a:xfrm>
+            <a:off x="311699" y="245000"/>
+            <a:ext cx="8520600" cy="572700"/>
+          </a:xfrm>
+        </p:spPr>
+        <p:txBody>
+          <a:bodyPr/>
+          <a:lstStyle/>
+          <a:p>
+            <a:r>
+              <a:rPr lang="en-US" dirty="0"/>
+              <a:t>Overview</a:t>
+            </a:r>
+          </a:p>
+        </p:txBody>
+      </p:sp>
+      <p:pic>
+        <p:nvPicPr>
+          <p:cNvPr id="5" name="Picture 4">
+            <a:extLst>
+              <a:ext uri="{FF2B5EF4-FFF2-40B4-BE49-F238E27FC236}">
+                <a16:creationId xmlns:a16="http://schemas.microsoft.com/office/drawing/2014/main" id="{7D332BC9-EB62-44E0-A50F-686085994675}"/>
+              </a:ext>
+            </a:extLst>
+          </p:cNvPr>
+          <p:cNvPicPr>
+            <a:picLocks noChangeAspect="1"/>
+          </p:cNvPicPr>
+          <p:nvPr/>
+        </p:nvPicPr>
+        <p:blipFill>
+          <a:blip r:embed="rId2"/>
+          <a:stretch>
+            <a:fillRect/>
+          </a:stretch>
+        </p:blipFill>
+        <p:spPr>
+          <a:xfrm>
+            <a:off x="1447905" y="885327"/>
+            <a:ext cx="6248189" cy="3929561"/>
+          </a:xfrm>
+          <a:prstGeom prst="rect">
+            <a:avLst/>
+          </a:prstGeom>
+        </p:spPr>
+      </p:pic>
+    </p:spTree>
+    <p:extLst>
+      <p:ext uri="{BB962C8B-B14F-4D97-AF65-F5344CB8AC3E}">
+        <p14:creationId xmlns:p14="http://schemas.microsoft.com/office/powerpoint/2010/main" val="4043951317"/>
+      </p:ext>
+    </p:extLst>
+  </p:cSld>
+  <p:clrMapOvr>
+    <a:masterClrMapping/>
+  </p:clrMapOvr>
+</p:sld>
+</file>
+
+<file path=ppt/slides/slide6.xml><?xml version="1.0" encoding="utf-8"?>
 <p:sld xmlns:a="http://schemas.openxmlformats.org/drawingml/2006/main" xmlns:r="http://schemas.openxmlformats.org/officeDocument/2006/relationships" xmlns:p="http://schemas.openxmlformats.org/presentationml/2006/main">
   <p:cSld>
     <p:spTree>
@@ -7494,11 +7528,7 @@
             </a:pPr>
             <a:r>
               <a:rPr lang="en" dirty="0"/>
-              <a:t>Goal: Predict the label of a data point from its </a:t>
-            </a:r>
-            <a:r>
-              <a:rPr lang="en" dirty="0" smtClean="0"/>
-              <a:t>feature data</a:t>
+              <a:t>Goal: Predict the label of a data point from its feature data</a:t>
             </a:r>
             <a:endParaRPr dirty="0"/>
           </a:p>
@@ -7617,11 +7647,7 @@
             </a:pPr>
             <a:r>
               <a:rPr lang="en" dirty="0"/>
-              <a:t>Support Vector Machines (SVM</a:t>
-            </a:r>
-            <a:r>
-              <a:rPr lang="en" dirty="0" smtClean="0"/>
-              <a:t>)</a:t>
+              <a:t>Support Vector Machines (SVM)</a:t>
             </a:r>
             <a:endParaRPr dirty="0"/>
           </a:p>
@@ -7677,7 +7703,7 @@
 </p:sld>
 </file>
 
-<file path=ppt/slides/slide5.xml><?xml version="1.0" encoding="utf-8"?>
+<file path=ppt/slides/slide7.xml><?xml version="1.0" encoding="utf-8"?>
 <p:sld xmlns:a="http://schemas.openxmlformats.org/drawingml/2006/main" xmlns:r="http://schemas.openxmlformats.org/officeDocument/2006/relationships" xmlns:p="http://schemas.openxmlformats.org/presentationml/2006/main">
   <p:cSld>
     <p:spTree>
@@ -7828,7 +7854,7 @@
 </p:sld>
 </file>
 
-<file path=ppt/slides/slide6.xml><?xml version="1.0" encoding="utf-8"?>
+<file path=ppt/slides/slide8.xml><?xml version="1.0" encoding="utf-8"?>
 <p:sld xmlns:a="http://schemas.openxmlformats.org/drawingml/2006/main" xmlns:r="http://schemas.openxmlformats.org/officeDocument/2006/relationships" xmlns:p="http://schemas.openxmlformats.org/presentationml/2006/main">
   <p:cSld>
     <p:spTree>

</xml_diff>